<commit_message>
Added new assets, changed image loading. Updated readme.
</commit_message>
<xml_diff>
--- a/Architecture.pptx
+++ b/Architecture.pptx
@@ -6,6 +6,7 @@
   </p:sldMasterIdLst>
   <p:sldIdLst>
     <p:sldId id="256" r:id="rId2"/>
+    <p:sldId id="257" r:id="rId3"/>
   </p:sldIdLst>
   <p:sldSz cx="12192000" cy="6858000"/>
   <p:notesSz cx="6858000" cy="9144000"/>
@@ -104,6 +105,11 @@
       </a:defRPr>
     </a:lvl9pPr>
   </p:defaultTextStyle>
+  <p:extLst>
+    <p:ext uri="{EFAFB233-063F-42B5-8137-9DF3F51BA10A}">
+      <p15:sldGuideLst xmlns:p15="http://schemas.microsoft.com/office/powerpoint/2012/main"/>
+    </p:ext>
+  </p:extLst>
 </p:presentation>
 </file>
 
@@ -256,7 +262,7 @@
           <a:p>
             <a:fld id="{D20F0465-1906-4372-AA85-C0BF4EDB9B54}" type="datetimeFigureOut">
               <a:rPr lang="en-US" smtClean="0"/>
-              <a:t>12/24/2025</a:t>
+              <a:t>12/25/2025</a:t>
             </a:fld>
             <a:endParaRPr lang="en-US"/>
           </a:p>
@@ -456,7 +462,7 @@
           <a:p>
             <a:fld id="{D20F0465-1906-4372-AA85-C0BF4EDB9B54}" type="datetimeFigureOut">
               <a:rPr lang="en-US" smtClean="0"/>
-              <a:t>12/24/2025</a:t>
+              <a:t>12/25/2025</a:t>
             </a:fld>
             <a:endParaRPr lang="en-US"/>
           </a:p>
@@ -666,7 +672,7 @@
           <a:p>
             <a:fld id="{D20F0465-1906-4372-AA85-C0BF4EDB9B54}" type="datetimeFigureOut">
               <a:rPr lang="en-US" smtClean="0"/>
-              <a:t>12/24/2025</a:t>
+              <a:t>12/25/2025</a:t>
             </a:fld>
             <a:endParaRPr lang="en-US"/>
           </a:p>
@@ -866,7 +872,7 @@
           <a:p>
             <a:fld id="{D20F0465-1906-4372-AA85-C0BF4EDB9B54}" type="datetimeFigureOut">
               <a:rPr lang="en-US" smtClean="0"/>
-              <a:t>12/24/2025</a:t>
+              <a:t>12/25/2025</a:t>
             </a:fld>
             <a:endParaRPr lang="en-US"/>
           </a:p>
@@ -1142,7 +1148,7 @@
           <a:p>
             <a:fld id="{D20F0465-1906-4372-AA85-C0BF4EDB9B54}" type="datetimeFigureOut">
               <a:rPr lang="en-US" smtClean="0"/>
-              <a:t>12/24/2025</a:t>
+              <a:t>12/25/2025</a:t>
             </a:fld>
             <a:endParaRPr lang="en-US"/>
           </a:p>
@@ -1410,7 +1416,7 @@
           <a:p>
             <a:fld id="{D20F0465-1906-4372-AA85-C0BF4EDB9B54}" type="datetimeFigureOut">
               <a:rPr lang="en-US" smtClean="0"/>
-              <a:t>12/24/2025</a:t>
+              <a:t>12/25/2025</a:t>
             </a:fld>
             <a:endParaRPr lang="en-US"/>
           </a:p>
@@ -1825,7 +1831,7 @@
           <a:p>
             <a:fld id="{D20F0465-1906-4372-AA85-C0BF4EDB9B54}" type="datetimeFigureOut">
               <a:rPr lang="en-US" smtClean="0"/>
-              <a:t>12/24/2025</a:t>
+              <a:t>12/25/2025</a:t>
             </a:fld>
             <a:endParaRPr lang="en-US"/>
           </a:p>
@@ -1967,7 +1973,7 @@
           <a:p>
             <a:fld id="{D20F0465-1906-4372-AA85-C0BF4EDB9B54}" type="datetimeFigureOut">
               <a:rPr lang="en-US" smtClean="0"/>
-              <a:t>12/24/2025</a:t>
+              <a:t>12/25/2025</a:t>
             </a:fld>
             <a:endParaRPr lang="en-US"/>
           </a:p>
@@ -2080,7 +2086,7 @@
           <a:p>
             <a:fld id="{D20F0465-1906-4372-AA85-C0BF4EDB9B54}" type="datetimeFigureOut">
               <a:rPr lang="en-US" smtClean="0"/>
-              <a:t>12/24/2025</a:t>
+              <a:t>12/25/2025</a:t>
             </a:fld>
             <a:endParaRPr lang="en-US"/>
           </a:p>
@@ -2393,7 +2399,7 @@
           <a:p>
             <a:fld id="{D20F0465-1906-4372-AA85-C0BF4EDB9B54}" type="datetimeFigureOut">
               <a:rPr lang="en-US" smtClean="0"/>
-              <a:t>12/24/2025</a:t>
+              <a:t>12/25/2025</a:t>
             </a:fld>
             <a:endParaRPr lang="en-US"/>
           </a:p>
@@ -2682,7 +2688,7 @@
           <a:p>
             <a:fld id="{D20F0465-1906-4372-AA85-C0BF4EDB9B54}" type="datetimeFigureOut">
               <a:rPr lang="en-US" smtClean="0"/>
-              <a:t>12/24/2025</a:t>
+              <a:t>12/25/2025</a:t>
             </a:fld>
             <a:endParaRPr lang="en-US"/>
           </a:p>
@@ -2925,7 +2931,7 @@
           <a:p>
             <a:fld id="{D20F0465-1906-4372-AA85-C0BF4EDB9B54}" type="datetimeFigureOut">
               <a:rPr lang="en-US" smtClean="0"/>
-              <a:t>12/24/2025</a:t>
+              <a:t>12/25/2025</a:t>
             </a:fld>
             <a:endParaRPr lang="en-US"/>
           </a:p>
@@ -3356,7 +3362,7 @@
         </p:nvGrpSpPr>
         <p:grpSpPr>
           <a:xfrm>
-            <a:off x="628650" y="156487"/>
+            <a:off x="320040" y="156487"/>
             <a:ext cx="7509693" cy="3855337"/>
             <a:chOff x="628650" y="156487"/>
             <a:chExt cx="7509693" cy="3855337"/>
@@ -5340,13 +5346,13 @@
           <p:nvPr>
             <p:extLst>
               <p:ext uri="{D42A27DB-BD31-4B8C-83A1-F6EECF244321}">
-                <p14:modId xmlns:p14="http://schemas.microsoft.com/office/powerpoint/2010/main" val="457381201"/>
+                <p14:modId xmlns:p14="http://schemas.microsoft.com/office/powerpoint/2010/main" val="3372042359"/>
               </p:ext>
             </p:extLst>
           </p:nvPr>
         </p:nvGraphicFramePr>
         <p:xfrm>
-          <a:off x="8315505" y="358499"/>
+          <a:off x="8144055" y="358499"/>
           <a:ext cx="1777892" cy="2225040"/>
         </p:xfrm>
         <a:graphic>
@@ -5555,13 +5561,13 @@
           <p:nvPr>
             <p:extLst>
               <p:ext uri="{D42A27DB-BD31-4B8C-83A1-F6EECF244321}">
-                <p14:modId xmlns:p14="http://schemas.microsoft.com/office/powerpoint/2010/main" val="3833678947"/>
+                <p14:modId xmlns:p14="http://schemas.microsoft.com/office/powerpoint/2010/main" val="1121483210"/>
               </p:ext>
             </p:extLst>
           </p:nvPr>
         </p:nvGraphicFramePr>
         <p:xfrm>
-          <a:off x="10338503" y="370126"/>
+          <a:off x="10322558" y="2846017"/>
           <a:ext cx="1549400" cy="1854200"/>
         </p:xfrm>
         <a:graphic>
@@ -5701,17 +5707,16 @@
                         <a:defRPr/>
                       </a:pPr>
                       <a:r>
-                        <a:rPr lang="en-US" dirty="0" err="1"/>
-                        <a:t>Widgets_ID</a:t>
+                        <a:rPr lang="en-US" dirty="0"/>
+                        <a:t>…</a:t>
                       </a:r>
-                      <a:endParaRPr lang="en-US" dirty="0"/>
                     </a:p>
                   </a:txBody>
                   <a:tcPr/>
                 </a:tc>
                 <a:extLst>
                   <a:ext uri="{0D108BD9-81ED-4DB2-BD59-A6C34878D82A}">
-                    <a16:rowId xmlns:a16="http://schemas.microsoft.com/office/drawing/2014/main" val="3430940077"/>
+                    <a16:rowId xmlns:a16="http://schemas.microsoft.com/office/drawing/2014/main" val="3353153450"/>
                   </a:ext>
                 </a:extLst>
               </a:tr>
@@ -5734,14 +5739,14 @@
           <p:nvPr>
             <p:extLst>
               <p:ext uri="{D42A27DB-BD31-4B8C-83A1-F6EECF244321}">
-                <p14:modId xmlns:p14="http://schemas.microsoft.com/office/powerpoint/2010/main" val="960751598"/>
+                <p14:modId xmlns:p14="http://schemas.microsoft.com/office/powerpoint/2010/main" val="4017025996"/>
               </p:ext>
             </p:extLst>
           </p:nvPr>
         </p:nvGraphicFramePr>
         <p:xfrm>
-          <a:off x="8315505" y="2846017"/>
-          <a:ext cx="1549400" cy="1854200"/>
+          <a:off x="8121195" y="2846017"/>
+          <a:ext cx="1549400" cy="1483360"/>
         </p:xfrm>
         <a:graphic>
           <a:graphicData uri="http://schemas.openxmlformats.org/drawingml/2006/table">
@@ -5855,6 +5860,244 @@
                   </a:ext>
                 </a:extLst>
               </a:tr>
+            </a:tbl>
+          </a:graphicData>
+        </a:graphic>
+      </p:graphicFrame>
+      <p:sp>
+        <p:nvSpPr>
+          <p:cNvPr id="1036" name="Rechteck 1035">
+            <a:extLst>
+              <a:ext uri="{FF2B5EF4-FFF2-40B4-BE49-F238E27FC236}">
+                <a16:creationId xmlns:a16="http://schemas.microsoft.com/office/drawing/2014/main" id="{6E7FCAC9-3818-54F6-0850-D74FEB406887}"/>
+              </a:ext>
+            </a:extLst>
+          </p:cNvPr>
+          <p:cNvSpPr/>
+          <p:nvPr/>
+        </p:nvSpPr>
+        <p:spPr>
+          <a:xfrm>
+            <a:off x="9602679" y="3356291"/>
+            <a:ext cx="135831" cy="101535"/>
+          </a:xfrm>
+          <a:prstGeom prst="rect">
+            <a:avLst/>
+          </a:prstGeom>
+        </p:spPr>
+        <p:style>
+          <a:lnRef idx="2">
+            <a:schemeClr val="dk1">
+              <a:shade val="15000"/>
+            </a:schemeClr>
+          </a:lnRef>
+          <a:fillRef idx="1">
+            <a:schemeClr val="dk1"/>
+          </a:fillRef>
+          <a:effectRef idx="0">
+            <a:schemeClr val="dk1"/>
+          </a:effectRef>
+          <a:fontRef idx="minor">
+            <a:schemeClr val="lt1"/>
+          </a:fontRef>
+        </p:style>
+        <p:txBody>
+          <a:bodyPr rtlCol="0" anchor="ctr"/>
+          <a:lstStyle/>
+          <a:p>
+            <a:pPr algn="ctr"/>
+            <a:endParaRPr lang="en-US"/>
+          </a:p>
+        </p:txBody>
+      </p:sp>
+      <p:cxnSp>
+        <p:nvCxnSpPr>
+          <p:cNvPr id="1051" name="Verbinder: gewinkelt 1050">
+            <a:extLst>
+              <a:ext uri="{FF2B5EF4-FFF2-40B4-BE49-F238E27FC236}">
+                <a16:creationId xmlns:a16="http://schemas.microsoft.com/office/drawing/2014/main" id="{0DB19AB4-60F4-F8AD-3088-D0E64E848C66}"/>
+              </a:ext>
+            </a:extLst>
+          </p:cNvPr>
+          <p:cNvCxnSpPr>
+            <a:cxnSpLocks/>
+            <a:stCxn id="1036" idx="3"/>
+            <a:endCxn id="1064" idx="3"/>
+          </p:cNvCxnSpPr>
+          <p:nvPr/>
+        </p:nvCxnSpPr>
+        <p:spPr>
+          <a:xfrm flipV="1">
+            <a:off x="9738510" y="2391269"/>
+            <a:ext cx="231027" cy="1015790"/>
+          </a:xfrm>
+          <a:prstGeom prst="bentConnector3">
+            <a:avLst>
+              <a:gd name="adj1" fmla="val 139579"/>
+            </a:avLst>
+          </a:prstGeom>
+        </p:spPr>
+        <p:style>
+          <a:lnRef idx="2">
+            <a:schemeClr val="dk1"/>
+          </a:lnRef>
+          <a:fillRef idx="0">
+            <a:schemeClr val="dk1"/>
+          </a:fillRef>
+          <a:effectRef idx="1">
+            <a:schemeClr val="dk1"/>
+          </a:effectRef>
+          <a:fontRef idx="minor">
+            <a:schemeClr val="tx1"/>
+          </a:fontRef>
+        </p:style>
+      </p:cxnSp>
+      <p:sp>
+        <p:nvSpPr>
+          <p:cNvPr id="1064" name="Rechteck 1063">
+            <a:extLst>
+              <a:ext uri="{FF2B5EF4-FFF2-40B4-BE49-F238E27FC236}">
+                <a16:creationId xmlns:a16="http://schemas.microsoft.com/office/drawing/2014/main" id="{4FE00F16-D9B2-2645-030C-FB62222EAA61}"/>
+              </a:ext>
+            </a:extLst>
+          </p:cNvPr>
+          <p:cNvSpPr/>
+          <p:nvPr/>
+        </p:nvSpPr>
+        <p:spPr>
+          <a:xfrm>
+            <a:off x="9833706" y="2340501"/>
+            <a:ext cx="135831" cy="101535"/>
+          </a:xfrm>
+          <a:prstGeom prst="rect">
+            <a:avLst/>
+          </a:prstGeom>
+        </p:spPr>
+        <p:style>
+          <a:lnRef idx="2">
+            <a:schemeClr val="dk1">
+              <a:shade val="15000"/>
+            </a:schemeClr>
+          </a:lnRef>
+          <a:fillRef idx="1">
+            <a:schemeClr val="dk1"/>
+          </a:fillRef>
+          <a:effectRef idx="0">
+            <a:schemeClr val="dk1"/>
+          </a:effectRef>
+          <a:fontRef idx="minor">
+            <a:schemeClr val="lt1"/>
+          </a:fontRef>
+        </p:style>
+        <p:txBody>
+          <a:bodyPr rtlCol="0" anchor="ctr"/>
+          <a:lstStyle/>
+          <a:p>
+            <a:pPr algn="ctr"/>
+            <a:endParaRPr lang="en-US"/>
+          </a:p>
+        </p:txBody>
+      </p:sp>
+      <p:graphicFrame>
+        <p:nvGraphicFramePr>
+          <p:cNvPr id="2" name="Tabelle 1">
+            <a:extLst>
+              <a:ext uri="{FF2B5EF4-FFF2-40B4-BE49-F238E27FC236}">
+                <a16:creationId xmlns:a16="http://schemas.microsoft.com/office/drawing/2014/main" id="{0CB3A0FE-8363-972D-B6FB-8ED928BA2CAD}"/>
+              </a:ext>
+            </a:extLst>
+          </p:cNvPr>
+          <p:cNvGraphicFramePr>
+            <a:graphicFrameLocks noGrp="1"/>
+          </p:cNvGraphicFramePr>
+          <p:nvPr>
+            <p:extLst>
+              <p:ext uri="{D42A27DB-BD31-4B8C-83A1-F6EECF244321}">
+                <p14:modId xmlns:p14="http://schemas.microsoft.com/office/powerpoint/2010/main" val="4071633602"/>
+              </p:ext>
+            </p:extLst>
+          </p:nvPr>
+        </p:nvGraphicFramePr>
+        <p:xfrm>
+          <a:off x="10093398" y="365350"/>
+          <a:ext cx="1794506" cy="1854200"/>
+        </p:xfrm>
+        <a:graphic>
+          <a:graphicData uri="http://schemas.openxmlformats.org/drawingml/2006/table">
+            <a:tbl>
+              <a:tblPr firstRow="1" bandRow="1">
+                <a:tableStyleId>{5C22544A-7EE6-4342-B048-85BDC9FD1C3A}</a:tableStyleId>
+              </a:tblPr>
+              <a:tblGrid>
+                <a:gridCol w="1794506">
+                  <a:extLst>
+                    <a:ext uri="{9D8B030D-6E8A-4147-A177-3AD203B41FA5}">
+                      <a16:colId xmlns:a16="http://schemas.microsoft.com/office/drawing/2014/main" val="2099496140"/>
+                    </a:ext>
+                  </a:extLst>
+                </a:gridCol>
+              </a:tblGrid>
+              <a:tr h="370840">
+                <a:tc>
+                  <a:txBody>
+                    <a:bodyPr/>
+                    <a:lstStyle/>
+                    <a:p>
+                      <a:r>
+                        <a:rPr lang="en-US" dirty="0"/>
+                        <a:t>Users</a:t>
+                      </a:r>
+                    </a:p>
+                  </a:txBody>
+                  <a:tcPr/>
+                </a:tc>
+                <a:extLst>
+                  <a:ext uri="{0D108BD9-81ED-4DB2-BD59-A6C34878D82A}">
+                    <a16:rowId xmlns:a16="http://schemas.microsoft.com/office/drawing/2014/main" val="1090893773"/>
+                  </a:ext>
+                </a:extLst>
+              </a:tr>
+              <a:tr h="370840">
+                <a:tc>
+                  <a:txBody>
+                    <a:bodyPr/>
+                    <a:lstStyle/>
+                    <a:p>
+                      <a:r>
+                        <a:rPr lang="en-US" dirty="0"/>
+                        <a:t>ID</a:t>
+                      </a:r>
+                    </a:p>
+                  </a:txBody>
+                  <a:tcPr/>
+                </a:tc>
+                <a:extLst>
+                  <a:ext uri="{0D108BD9-81ED-4DB2-BD59-A6C34878D82A}">
+                    <a16:rowId xmlns:a16="http://schemas.microsoft.com/office/drawing/2014/main" val="1555378732"/>
+                  </a:ext>
+                </a:extLst>
+              </a:tr>
+              <a:tr h="370840">
+                <a:tc>
+                  <a:txBody>
+                    <a:bodyPr/>
+                    <a:lstStyle/>
+                    <a:p>
+                      <a:r>
+                        <a:rPr lang="en-US" dirty="0" err="1"/>
+                        <a:t>Component_ID</a:t>
+                      </a:r>
+                      <a:endParaRPr lang="en-US" dirty="0"/>
+                    </a:p>
+                  </a:txBody>
+                  <a:tcPr/>
+                </a:tc>
+                <a:extLst>
+                  <a:ext uri="{0D108BD9-81ED-4DB2-BD59-A6C34878D82A}">
+                    <a16:rowId xmlns:a16="http://schemas.microsoft.com/office/drawing/2014/main" val="3003634564"/>
+                  </a:ext>
+                </a:extLst>
+              </a:tr>
               <a:tr h="370840">
                 <a:tc>
                   <a:txBody>
@@ -5889,6 +6132,43 @@
                 </a:tc>
                 <a:extLst>
                   <a:ext uri="{0D108BD9-81ED-4DB2-BD59-A6C34878D82A}">
+                    <a16:rowId xmlns:a16="http://schemas.microsoft.com/office/drawing/2014/main" val="4251474869"/>
+                  </a:ext>
+                </a:extLst>
+              </a:tr>
+              <a:tr h="370840">
+                <a:tc>
+                  <a:txBody>
+                    <a:bodyPr/>
+                    <a:lstStyle/>
+                    <a:p>
+                      <a:pPr marL="0" marR="0" lvl="0" indent="0" algn="l" defTabSz="914400" rtl="0" eaLnBrk="1" fontAlgn="auto" latinLnBrk="0" hangingPunct="1">
+                        <a:lnSpc>
+                          <a:spcPct val="100000"/>
+                        </a:lnSpc>
+                        <a:spcBef>
+                          <a:spcPts val="0"/>
+                        </a:spcBef>
+                        <a:spcAft>
+                          <a:spcPts val="0"/>
+                        </a:spcAft>
+                        <a:buClrTx/>
+                        <a:buSzTx/>
+                        <a:buFontTx/>
+                        <a:buNone/>
+                        <a:tabLst/>
+                        <a:defRPr/>
+                      </a:pPr>
+                      <a:r>
+                        <a:rPr lang="en-US" dirty="0"/>
+                        <a:t>…</a:t>
+                      </a:r>
+                    </a:p>
+                  </a:txBody>
+                  <a:tcPr/>
+                </a:tc>
+                <a:extLst>
+                  <a:ext uri="{0D108BD9-81ED-4DB2-BD59-A6C34878D82A}">
                     <a16:rowId xmlns:a16="http://schemas.microsoft.com/office/drawing/2014/main" val="1896318361"/>
                   </a:ext>
                 </a:extLst>
@@ -5899,10 +6179,10 @@
       </p:graphicFrame>
       <p:sp>
         <p:nvSpPr>
-          <p:cNvPr id="1034" name="Rechteck 1033">
-            <a:extLst>
-              <a:ext uri="{FF2B5EF4-FFF2-40B4-BE49-F238E27FC236}">
-                <a16:creationId xmlns:a16="http://schemas.microsoft.com/office/drawing/2014/main" id="{C7DDFA81-6070-A437-C1DD-779B39472EE5}"/>
+          <p:cNvPr id="9" name="Rechteck 8">
+            <a:extLst>
+              <a:ext uri="{FF2B5EF4-FFF2-40B4-BE49-F238E27FC236}">
+                <a16:creationId xmlns:a16="http://schemas.microsoft.com/office/drawing/2014/main" id="{62BAABF9-B719-B50D-285C-D5C597062D79}"/>
               </a:ext>
             </a:extLst>
           </p:cNvPr>
@@ -5911,7 +6191,7 @@
         </p:nvSpPr>
         <p:spPr>
           <a:xfrm>
-            <a:off x="9758710" y="864748"/>
+            <a:off x="11804044" y="4091834"/>
             <a:ext cx="135831" cy="101535"/>
           </a:xfrm>
           <a:prstGeom prst="rect">
@@ -5945,10 +6225,10 @@
       </p:sp>
       <p:sp>
         <p:nvSpPr>
-          <p:cNvPr id="1035" name="Rechteck 1034">
-            <a:extLst>
-              <a:ext uri="{FF2B5EF4-FFF2-40B4-BE49-F238E27FC236}">
-                <a16:creationId xmlns:a16="http://schemas.microsoft.com/office/drawing/2014/main" id="{2A44C5DB-1DDE-1D16-8955-68F1087938D1}"/>
+          <p:cNvPr id="10" name="Rechteck 9">
+            <a:extLst>
+              <a:ext uri="{FF2B5EF4-FFF2-40B4-BE49-F238E27FC236}">
+                <a16:creationId xmlns:a16="http://schemas.microsoft.com/office/drawing/2014/main" id="{1EAE1387-7E6E-F3F3-3DD8-206B1CBD01C8}"/>
               </a:ext>
             </a:extLst>
           </p:cNvPr>
@@ -5957,7 +6237,7 @@
         </p:nvSpPr>
         <p:spPr>
           <a:xfrm>
-            <a:off x="10261941" y="1978288"/>
+            <a:off x="11804043" y="1629442"/>
             <a:ext cx="135831" cy="101535"/>
           </a:xfrm>
           <a:prstGeom prst="rect">
@@ -5989,12 +6269,94 @@
           </a:p>
         </p:txBody>
       </p:sp>
-      <p:sp>
-        <p:nvSpPr>
-          <p:cNvPr id="1036" name="Rechteck 1035">
-            <a:extLst>
-              <a:ext uri="{FF2B5EF4-FFF2-40B4-BE49-F238E27FC236}">
-                <a16:creationId xmlns:a16="http://schemas.microsoft.com/office/drawing/2014/main" id="{6E7FCAC9-3818-54F6-0850-D74FEB406887}"/>
+      <p:cxnSp>
+        <p:nvCxnSpPr>
+          <p:cNvPr id="18" name="Verbinder: gewinkelt 17">
+            <a:extLst>
+              <a:ext uri="{FF2B5EF4-FFF2-40B4-BE49-F238E27FC236}">
+                <a16:creationId xmlns:a16="http://schemas.microsoft.com/office/drawing/2014/main" id="{72BE1E70-4842-5606-74DE-1CC0F7FD0423}"/>
+              </a:ext>
+            </a:extLst>
+          </p:cNvPr>
+          <p:cNvCxnSpPr>
+            <a:stCxn id="10" idx="3"/>
+            <a:endCxn id="9" idx="3"/>
+          </p:cNvCxnSpPr>
+          <p:nvPr/>
+        </p:nvCxnSpPr>
+        <p:spPr>
+          <a:xfrm>
+            <a:off x="11939874" y="1680210"/>
+            <a:ext cx="1" cy="2462392"/>
+          </a:xfrm>
+          <a:prstGeom prst="bentConnector3">
+            <a:avLst>
+              <a:gd name="adj1" fmla="val 2147483646"/>
+            </a:avLst>
+          </a:prstGeom>
+        </p:spPr>
+        <p:style>
+          <a:lnRef idx="2">
+            <a:schemeClr val="dk1"/>
+          </a:lnRef>
+          <a:fillRef idx="0">
+            <a:schemeClr val="dk1"/>
+          </a:fillRef>
+          <a:effectRef idx="1">
+            <a:schemeClr val="dk1"/>
+          </a:effectRef>
+          <a:fontRef idx="minor">
+            <a:schemeClr val="tx1"/>
+          </a:fontRef>
+        </p:style>
+      </p:cxnSp>
+      <p:cxnSp>
+        <p:nvCxnSpPr>
+          <p:cNvPr id="26" name="Verbinder: gewinkelt 25">
+            <a:extLst>
+              <a:ext uri="{FF2B5EF4-FFF2-40B4-BE49-F238E27FC236}">
+                <a16:creationId xmlns:a16="http://schemas.microsoft.com/office/drawing/2014/main" id="{281AEF18-2128-DFBA-23EB-F574E880AF1B}"/>
+              </a:ext>
+            </a:extLst>
+          </p:cNvPr>
+          <p:cNvCxnSpPr>
+            <a:cxnSpLocks/>
+            <a:stCxn id="1036" idx="3"/>
+          </p:cNvCxnSpPr>
+          <p:nvPr/>
+        </p:nvCxnSpPr>
+        <p:spPr>
+          <a:xfrm flipV="1">
+            <a:off x="9738510" y="2534496"/>
+            <a:ext cx="956878" cy="872563"/>
+          </a:xfrm>
+          <a:prstGeom prst="bentConnector3">
+            <a:avLst>
+              <a:gd name="adj1" fmla="val 50000"/>
+            </a:avLst>
+          </a:prstGeom>
+        </p:spPr>
+        <p:style>
+          <a:lnRef idx="2">
+            <a:schemeClr val="dk1"/>
+          </a:lnRef>
+          <a:fillRef idx="0">
+            <a:schemeClr val="dk1"/>
+          </a:fillRef>
+          <a:effectRef idx="1">
+            <a:schemeClr val="dk1"/>
+          </a:effectRef>
+          <a:fontRef idx="minor">
+            <a:schemeClr val="tx1"/>
+          </a:fontRef>
+        </p:style>
+      </p:cxnSp>
+      <p:sp>
+        <p:nvSpPr>
+          <p:cNvPr id="33" name="Rechteck 32">
+            <a:extLst>
+              <a:ext uri="{FF2B5EF4-FFF2-40B4-BE49-F238E27FC236}">
+                <a16:creationId xmlns:a16="http://schemas.microsoft.com/office/drawing/2014/main" id="{DA932C55-51F0-EE9C-408D-4E29E953A2FF}"/>
               </a:ext>
             </a:extLst>
           </p:cNvPr>
@@ -6003,7 +6365,7 @@
         </p:nvSpPr>
         <p:spPr>
           <a:xfrm>
-            <a:off x="9796989" y="3356291"/>
+            <a:off x="11778058" y="1222392"/>
             <a:ext cx="135831" cy="101535"/>
           </a:xfrm>
           <a:prstGeom prst="rect">
@@ -6037,28 +6399,28 @@
       </p:sp>
       <p:cxnSp>
         <p:nvCxnSpPr>
-          <p:cNvPr id="1038" name="Verbinder: gewinkelt 1037">
-            <a:extLst>
-              <a:ext uri="{FF2B5EF4-FFF2-40B4-BE49-F238E27FC236}">
-                <a16:creationId xmlns:a16="http://schemas.microsoft.com/office/drawing/2014/main" id="{8F5DECCF-BA85-3BF1-8A5C-79431742CBD0}"/>
+          <p:cNvPr id="38" name="Verbinder: gewinkelt 37">
+            <a:extLst>
+              <a:ext uri="{FF2B5EF4-FFF2-40B4-BE49-F238E27FC236}">
+                <a16:creationId xmlns:a16="http://schemas.microsoft.com/office/drawing/2014/main" id="{F43DCE22-9670-C180-9326-C22E0F724E89}"/>
               </a:ext>
             </a:extLst>
           </p:cNvPr>
           <p:cNvCxnSpPr>
             <a:cxnSpLocks/>
-            <a:stCxn id="1034" idx="3"/>
-            <a:endCxn id="1035" idx="1"/>
+            <a:endCxn id="2" idx="3"/>
           </p:cNvCxnSpPr>
           <p:nvPr/>
         </p:nvCxnSpPr>
         <p:spPr>
-          <a:xfrm>
-            <a:off x="9894541" y="915516"/>
-            <a:ext cx="367400" cy="1113540"/>
+          <a:xfrm rot="5400000" flipH="1" flipV="1">
+            <a:off x="10672336" y="1315503"/>
+            <a:ext cx="1238621" cy="1192516"/>
           </a:xfrm>
-          <a:prstGeom prst="bentConnector3">
+          <a:prstGeom prst="bentConnector4">
             <a:avLst>
-              <a:gd name="adj1" fmla="val 82263"/>
+              <a:gd name="adj1" fmla="val -242"/>
+              <a:gd name="adj2" fmla="val 119170"/>
             </a:avLst>
           </a:prstGeom>
         </p:spPr>
@@ -6077,54 +6439,275 @@
           </a:fontRef>
         </p:style>
       </p:cxnSp>
-      <p:cxnSp>
-        <p:nvCxnSpPr>
-          <p:cNvPr id="1051" name="Verbinder: gewinkelt 1050">
-            <a:extLst>
-              <a:ext uri="{FF2B5EF4-FFF2-40B4-BE49-F238E27FC236}">
-                <a16:creationId xmlns:a16="http://schemas.microsoft.com/office/drawing/2014/main" id="{0DB19AB4-60F4-F8AD-3088-D0E64E848C66}"/>
-              </a:ext>
-            </a:extLst>
-          </p:cNvPr>
-          <p:cNvCxnSpPr>
-            <a:cxnSpLocks/>
-            <a:stCxn id="1036" idx="3"/>
-            <a:endCxn id="1064" idx="3"/>
-          </p:cNvCxnSpPr>
+      <p:sp>
+        <p:nvSpPr>
+          <p:cNvPr id="61" name="Textfeld 60">
+            <a:extLst>
+              <a:ext uri="{FF2B5EF4-FFF2-40B4-BE49-F238E27FC236}">
+                <a16:creationId xmlns:a16="http://schemas.microsoft.com/office/drawing/2014/main" id="{2E0B9F83-5B90-A83A-94CC-229F2B9B453B}"/>
+              </a:ext>
+            </a:extLst>
+          </p:cNvPr>
+          <p:cNvSpPr txBox="1"/>
           <p:nvPr/>
-        </p:nvCxnSpPr>
+        </p:nvSpPr>
         <p:spPr>
-          <a:xfrm flipV="1">
-            <a:off x="9932820" y="2391269"/>
-            <a:ext cx="208167" cy="1015790"/>
+          <a:xfrm>
+            <a:off x="9590725" y="2756982"/>
+            <a:ext cx="526595" cy="307777"/>
           </a:xfrm>
-          <a:prstGeom prst="bentConnector3">
-            <a:avLst>
-              <a:gd name="adj1" fmla="val 209816"/>
-            </a:avLst>
+          <a:prstGeom prst="rect">
+            <a:avLst/>
           </a:prstGeom>
+          <a:noFill/>
+        </p:spPr>
+        <p:txBody>
+          <a:bodyPr wrap="square">
+            <a:spAutoFit/>
+          </a:bodyPr>
+          <a:lstStyle/>
+          <a:p>
+            <a:r>
+              <a:rPr lang="en-US" sz="1400" dirty="0"/>
+              <a:t>N:M</a:t>
+            </a:r>
+          </a:p>
+        </p:txBody>
+      </p:sp>
+      <p:sp>
+        <p:nvSpPr>
+          <p:cNvPr id="62" name="Textfeld 61">
+            <a:extLst>
+              <a:ext uri="{FF2B5EF4-FFF2-40B4-BE49-F238E27FC236}">
+                <a16:creationId xmlns:a16="http://schemas.microsoft.com/office/drawing/2014/main" id="{3D0275D1-9DE7-E3FF-10EB-2D4312C5830C}"/>
+              </a:ext>
+            </a:extLst>
+          </p:cNvPr>
+          <p:cNvSpPr txBox="1"/>
+          <p:nvPr/>
+        </p:nvSpPr>
+        <p:spPr>
+          <a:xfrm>
+            <a:off x="10667364" y="2256801"/>
+            <a:ext cx="526595" cy="307777"/>
+          </a:xfrm>
+          <a:prstGeom prst="rect">
+            <a:avLst/>
+          </a:prstGeom>
+          <a:noFill/>
+        </p:spPr>
+        <p:txBody>
+          <a:bodyPr wrap="square">
+            <a:spAutoFit/>
+          </a:bodyPr>
+          <a:lstStyle/>
+          <a:p>
+            <a:r>
+              <a:rPr lang="en-US" sz="1400" dirty="0"/>
+              <a:t>N:M</a:t>
+            </a:r>
+          </a:p>
+        </p:txBody>
+      </p:sp>
+      <p:sp>
+        <p:nvSpPr>
+          <p:cNvPr id="1024" name="Textfeld 1023">
+            <a:extLst>
+              <a:ext uri="{FF2B5EF4-FFF2-40B4-BE49-F238E27FC236}">
+                <a16:creationId xmlns:a16="http://schemas.microsoft.com/office/drawing/2014/main" id="{FA123C84-FB4A-5FD5-011D-88D4B2ECBBC6}"/>
+              </a:ext>
+            </a:extLst>
+          </p:cNvPr>
+          <p:cNvSpPr txBox="1"/>
+          <p:nvPr/>
+        </p:nvSpPr>
+        <p:spPr>
+          <a:xfrm>
+            <a:off x="11514760" y="2592315"/>
+            <a:ext cx="526595" cy="307777"/>
+          </a:xfrm>
+          <a:prstGeom prst="rect">
+            <a:avLst/>
+          </a:prstGeom>
+          <a:noFill/>
+        </p:spPr>
+        <p:txBody>
+          <a:bodyPr wrap="square">
+            <a:spAutoFit/>
+          </a:bodyPr>
+          <a:lstStyle/>
+          <a:p>
+            <a:r>
+              <a:rPr lang="en-US" sz="1400" dirty="0"/>
+              <a:t>1:M</a:t>
+            </a:r>
+          </a:p>
+        </p:txBody>
+      </p:sp>
+    </p:spTree>
+    <p:extLst>
+      <p:ext uri="{BB962C8B-B14F-4D97-AF65-F5344CB8AC3E}">
+        <p14:creationId xmlns:p14="http://schemas.microsoft.com/office/powerpoint/2010/main" val="1556649687"/>
+      </p:ext>
+    </p:extLst>
+  </p:cSld>
+  <p:clrMapOvr>
+    <a:masterClrMapping/>
+  </p:clrMapOvr>
+</p:sld>
+</file>
+
+<file path=ppt/slides/slide2.xml><?xml version="1.0" encoding="utf-8"?>
+<p:sld xmlns:a="http://schemas.openxmlformats.org/drawingml/2006/main" xmlns:r="http://schemas.openxmlformats.org/officeDocument/2006/relationships" xmlns:p="http://schemas.openxmlformats.org/presentationml/2006/main">
+  <p:cSld>
+    <p:spTree>
+      <p:nvGrpSpPr>
+        <p:cNvPr id="1" name="">
+          <a:extLst>
+            <a:ext uri="{FF2B5EF4-FFF2-40B4-BE49-F238E27FC236}">
+              <a16:creationId xmlns:a16="http://schemas.microsoft.com/office/drawing/2014/main" id="{4A0EF938-3646-D6DF-1F0F-2F257E14FE5E}"/>
+            </a:ext>
+          </a:extLst>
+        </p:cNvPr>
+        <p:cNvGrpSpPr/>
+        <p:nvPr/>
+      </p:nvGrpSpPr>
+      <p:grpSpPr>
+        <a:xfrm>
+          <a:off x="0" y="0"/>
+          <a:ext cx="0" cy="0"/>
+          <a:chOff x="0" y="0"/>
+          <a:chExt cx="0" cy="0"/>
+        </a:xfrm>
+      </p:grpSpPr>
+      <p:sp>
+        <p:nvSpPr>
+          <p:cNvPr id="1065" name="Textfeld 1064">
+            <a:extLst>
+              <a:ext uri="{FF2B5EF4-FFF2-40B4-BE49-F238E27FC236}">
+                <a16:creationId xmlns:a16="http://schemas.microsoft.com/office/drawing/2014/main" id="{73F37896-30D2-DAF6-7FB9-0EC34A9E2A79}"/>
+              </a:ext>
+            </a:extLst>
+          </p:cNvPr>
+          <p:cNvSpPr txBox="1"/>
+          <p:nvPr/>
+        </p:nvSpPr>
+        <p:spPr>
+          <a:xfrm>
+            <a:off x="738188" y="937718"/>
+            <a:ext cx="3776662" cy="2123658"/>
+          </a:xfrm>
+          <a:prstGeom prst="rect">
+            <a:avLst/>
+          </a:prstGeom>
+          <a:noFill/>
+        </p:spPr>
+        <p:txBody>
+          <a:bodyPr wrap="square">
+            <a:spAutoFit/>
+          </a:bodyPr>
+          <a:lstStyle/>
+          <a:p>
+            <a:r>
+              <a:rPr lang="en-US" b="1" dirty="0"/>
+              <a:t>Component1</a:t>
+            </a:r>
+          </a:p>
+          <a:p>
+            <a:endParaRPr lang="en-US" dirty="0"/>
+          </a:p>
+          <a:p>
+            <a:endParaRPr lang="en-US" dirty="0"/>
+          </a:p>
+          <a:p>
+            <a:endParaRPr lang="en-US" dirty="0"/>
+          </a:p>
+          <a:p>
+            <a:endParaRPr lang="en-US" dirty="0"/>
+          </a:p>
+          <a:p>
+            <a:endParaRPr lang="en-US" sz="1400" dirty="0"/>
+          </a:p>
+          <a:p>
+            <a:r>
+              <a:rPr lang="en-US" sz="1400" dirty="0" err="1"/>
+              <a:t>Component_Type_From_Component</a:t>
+            </a:r>
+            <a:r>
+              <a:rPr lang="en-US" sz="1400" dirty="0"/>
+              <a:t>: Grid </a:t>
+            </a:r>
+          </a:p>
+          <a:p>
+            <a:r>
+              <a:rPr lang="en-US" sz="1400" dirty="0" err="1"/>
+              <a:t>Component_Order</a:t>
+            </a:r>
+            <a:r>
+              <a:rPr lang="en-US" sz="1400" dirty="0"/>
+              <a:t>: 0</a:t>
+            </a:r>
+          </a:p>
+        </p:txBody>
+      </p:sp>
+      <p:sp>
+        <p:nvSpPr>
+          <p:cNvPr id="1046" name="Rechteck 1045">
+            <a:extLst>
+              <a:ext uri="{FF2B5EF4-FFF2-40B4-BE49-F238E27FC236}">
+                <a16:creationId xmlns:a16="http://schemas.microsoft.com/office/drawing/2014/main" id="{1C2C072A-C90C-EBD9-D236-418C4823C71B}"/>
+              </a:ext>
+            </a:extLst>
+          </p:cNvPr>
+          <p:cNvSpPr/>
+          <p:nvPr/>
+        </p:nvSpPr>
+        <p:spPr>
+          <a:xfrm>
+            <a:off x="518612" y="804588"/>
+            <a:ext cx="3870508" cy="2256788"/>
+          </a:xfrm>
+          <a:prstGeom prst="rect">
+            <a:avLst/>
+          </a:prstGeom>
+          <a:noFill/>
+          <a:ln>
+            <a:solidFill>
+              <a:schemeClr val="tx1"/>
+            </a:solidFill>
+          </a:ln>
         </p:spPr>
         <p:style>
           <a:lnRef idx="2">
-            <a:schemeClr val="dk1"/>
+            <a:schemeClr val="accent1">
+              <a:shade val="15000"/>
+            </a:schemeClr>
           </a:lnRef>
-          <a:fillRef idx="0">
-            <a:schemeClr val="dk1"/>
+          <a:fillRef idx="1">
+            <a:schemeClr val="accent1"/>
           </a:fillRef>
-          <a:effectRef idx="1">
-            <a:schemeClr val="dk1"/>
+          <a:effectRef idx="0">
+            <a:schemeClr val="accent1"/>
           </a:effectRef>
           <a:fontRef idx="minor">
-            <a:schemeClr val="tx1"/>
+            <a:schemeClr val="lt1"/>
           </a:fontRef>
         </p:style>
-      </p:cxnSp>
-      <p:sp>
-        <p:nvSpPr>
-          <p:cNvPr id="1064" name="Rechteck 1063">
-            <a:extLst>
-              <a:ext uri="{FF2B5EF4-FFF2-40B4-BE49-F238E27FC236}">
-                <a16:creationId xmlns:a16="http://schemas.microsoft.com/office/drawing/2014/main" id="{4FE00F16-D9B2-2645-030C-FB62222EAA61}"/>
+        <p:txBody>
+          <a:bodyPr rtlCol="0" anchor="ctr"/>
+          <a:lstStyle/>
+          <a:p>
+            <a:pPr algn="ctr"/>
+            <a:endParaRPr lang="en-US"/>
+          </a:p>
+        </p:txBody>
+      </p:sp>
+      <p:sp>
+        <p:nvSpPr>
+          <p:cNvPr id="1059" name="Rechteck 1058">
+            <a:extLst>
+              <a:ext uri="{FF2B5EF4-FFF2-40B4-BE49-F238E27FC236}">
+                <a16:creationId xmlns:a16="http://schemas.microsoft.com/office/drawing/2014/main" id="{332672E0-FFC7-00FC-F82F-BA7A7C42C65E}"/>
               </a:ext>
             </a:extLst>
           </p:cNvPr>
@@ -6133,42 +6716,761 @@
         </p:nvSpPr>
         <p:spPr>
           <a:xfrm>
-            <a:off x="10005156" y="2340501"/>
-            <a:ext cx="135831" cy="101535"/>
+            <a:off x="751022" y="1314450"/>
+            <a:ext cx="1523548" cy="1080959"/>
+          </a:xfrm>
+          <a:prstGeom prst="rect">
+            <a:avLst/>
+          </a:prstGeom>
+          <a:noFill/>
+          <a:ln>
+            <a:solidFill>
+              <a:schemeClr val="tx1"/>
+            </a:solidFill>
+          </a:ln>
+        </p:spPr>
+        <p:style>
+          <a:lnRef idx="2">
+            <a:schemeClr val="accent1">
+              <a:shade val="15000"/>
+            </a:schemeClr>
+          </a:lnRef>
+          <a:fillRef idx="1">
+            <a:schemeClr val="accent1"/>
+          </a:fillRef>
+          <a:effectRef idx="0">
+            <a:schemeClr val="accent1"/>
+          </a:effectRef>
+          <a:fontRef idx="minor">
+            <a:schemeClr val="lt1"/>
+          </a:fontRef>
+        </p:style>
+        <p:txBody>
+          <a:bodyPr rtlCol="0" anchor="ctr"/>
+          <a:lstStyle/>
+          <a:p>
+            <a:pPr algn="ctr"/>
+            <a:endParaRPr lang="en-US"/>
+          </a:p>
+        </p:txBody>
+      </p:sp>
+      <p:sp>
+        <p:nvSpPr>
+          <p:cNvPr id="1060" name="Rechteck 1059">
+            <a:extLst>
+              <a:ext uri="{FF2B5EF4-FFF2-40B4-BE49-F238E27FC236}">
+                <a16:creationId xmlns:a16="http://schemas.microsoft.com/office/drawing/2014/main" id="{19709F44-302D-4656-10C4-A027983635C3}"/>
+              </a:ext>
+            </a:extLst>
+          </p:cNvPr>
+          <p:cNvSpPr/>
+          <p:nvPr/>
+        </p:nvSpPr>
+        <p:spPr>
+          <a:xfrm>
+            <a:off x="2570071" y="1314449"/>
+            <a:ext cx="1523548" cy="1080959"/>
+          </a:xfrm>
+          <a:prstGeom prst="rect">
+            <a:avLst/>
+          </a:prstGeom>
+          <a:noFill/>
+          <a:ln>
+            <a:solidFill>
+              <a:schemeClr val="tx1"/>
+            </a:solidFill>
+          </a:ln>
+        </p:spPr>
+        <p:style>
+          <a:lnRef idx="2">
+            <a:schemeClr val="accent1">
+              <a:shade val="15000"/>
+            </a:schemeClr>
+          </a:lnRef>
+          <a:fillRef idx="1">
+            <a:schemeClr val="accent1"/>
+          </a:fillRef>
+          <a:effectRef idx="0">
+            <a:schemeClr val="accent1"/>
+          </a:effectRef>
+          <a:fontRef idx="minor">
+            <a:schemeClr val="lt1"/>
+          </a:fontRef>
+        </p:style>
+        <p:txBody>
+          <a:bodyPr rtlCol="0" anchor="ctr"/>
+          <a:lstStyle/>
+          <a:p>
+            <a:pPr algn="ctr"/>
+            <a:endParaRPr lang="en-US"/>
+          </a:p>
+        </p:txBody>
+      </p:sp>
+      <p:sp>
+        <p:nvSpPr>
+          <p:cNvPr id="1062" name="Textfeld 1061">
+            <a:extLst>
+              <a:ext uri="{FF2B5EF4-FFF2-40B4-BE49-F238E27FC236}">
+                <a16:creationId xmlns:a16="http://schemas.microsoft.com/office/drawing/2014/main" id="{62350CF5-87AF-2F5A-8EA3-77BB80AE507B}"/>
+              </a:ext>
+            </a:extLst>
+          </p:cNvPr>
+          <p:cNvSpPr txBox="1"/>
+          <p:nvPr/>
+        </p:nvSpPr>
+        <p:spPr>
+          <a:xfrm>
+            <a:off x="751022" y="1671155"/>
+            <a:ext cx="1513797" cy="800219"/>
+          </a:xfrm>
+          <a:prstGeom prst="rect">
+            <a:avLst/>
+          </a:prstGeom>
+          <a:noFill/>
+        </p:spPr>
+        <p:txBody>
+          <a:bodyPr wrap="square">
+            <a:spAutoFit/>
+          </a:bodyPr>
+          <a:lstStyle/>
+          <a:p>
+            <a:pPr algn="ctr"/>
+            <a:r>
+              <a:rPr lang="en-US" b="1" dirty="0"/>
+              <a:t>Widget1</a:t>
+            </a:r>
+          </a:p>
+          <a:p>
+            <a:endParaRPr lang="en-US" sz="1400" dirty="0"/>
+          </a:p>
+          <a:p>
+            <a:r>
+              <a:rPr lang="en-US" sz="1400" dirty="0"/>
+              <a:t>Priority:999</a:t>
+            </a:r>
+          </a:p>
+        </p:txBody>
+      </p:sp>
+      <p:sp>
+        <p:nvSpPr>
+          <p:cNvPr id="1073" name="Textfeld 1072">
+            <a:extLst>
+              <a:ext uri="{FF2B5EF4-FFF2-40B4-BE49-F238E27FC236}">
+                <a16:creationId xmlns:a16="http://schemas.microsoft.com/office/drawing/2014/main" id="{F81C1AAE-DFA3-9425-0AAA-474E4B91DB85}"/>
+              </a:ext>
+            </a:extLst>
+          </p:cNvPr>
+          <p:cNvSpPr txBox="1"/>
+          <p:nvPr/>
+        </p:nvSpPr>
+        <p:spPr>
+          <a:xfrm>
+            <a:off x="2575560" y="1671155"/>
+            <a:ext cx="1513797" cy="800219"/>
+          </a:xfrm>
+          <a:prstGeom prst="rect">
+            <a:avLst/>
+          </a:prstGeom>
+          <a:noFill/>
+        </p:spPr>
+        <p:txBody>
+          <a:bodyPr wrap="square">
+            <a:spAutoFit/>
+          </a:bodyPr>
+          <a:lstStyle/>
+          <a:p>
+            <a:pPr algn="ctr"/>
+            <a:r>
+              <a:rPr lang="en-US" b="1" dirty="0" err="1"/>
+              <a:t>WidgetX</a:t>
+            </a:r>
+            <a:endParaRPr lang="en-US" b="1" dirty="0"/>
+          </a:p>
+          <a:p>
+            <a:endParaRPr lang="en-US" sz="1400" dirty="0"/>
+          </a:p>
+          <a:p>
+            <a:r>
+              <a:rPr lang="en-US" sz="1400" dirty="0"/>
+              <a:t>Priority:0</a:t>
+            </a:r>
+          </a:p>
+        </p:txBody>
+      </p:sp>
+      <p:sp>
+        <p:nvSpPr>
+          <p:cNvPr id="1074" name="Textfeld 1073">
+            <a:extLst>
+              <a:ext uri="{FF2B5EF4-FFF2-40B4-BE49-F238E27FC236}">
+                <a16:creationId xmlns:a16="http://schemas.microsoft.com/office/drawing/2014/main" id="{3F48A715-A5BD-826E-EFB1-03DC355A33A0}"/>
+              </a:ext>
+            </a:extLst>
+          </p:cNvPr>
+          <p:cNvSpPr txBox="1"/>
+          <p:nvPr/>
+        </p:nvSpPr>
+        <p:spPr>
+          <a:xfrm>
+            <a:off x="2241960" y="1670262"/>
+            <a:ext cx="343352" cy="369332"/>
+          </a:xfrm>
+          <a:prstGeom prst="rect">
+            <a:avLst/>
+          </a:prstGeom>
+          <a:noFill/>
+        </p:spPr>
+        <p:txBody>
+          <a:bodyPr wrap="square">
+            <a:spAutoFit/>
+          </a:bodyPr>
+          <a:lstStyle/>
+          <a:p>
+            <a:r>
+              <a:rPr lang="en-US" dirty="0"/>
+              <a:t>…</a:t>
+            </a:r>
+          </a:p>
+        </p:txBody>
+      </p:sp>
+      <p:sp>
+        <p:nvSpPr>
+          <p:cNvPr id="1075" name="Textfeld 1074">
+            <a:extLst>
+              <a:ext uri="{FF2B5EF4-FFF2-40B4-BE49-F238E27FC236}">
+                <a16:creationId xmlns:a16="http://schemas.microsoft.com/office/drawing/2014/main" id="{DCC51E91-2667-EF7E-103B-761DDB77A299}"/>
+              </a:ext>
+            </a:extLst>
+          </p:cNvPr>
+          <p:cNvSpPr txBox="1"/>
+          <p:nvPr/>
+        </p:nvSpPr>
+        <p:spPr>
+          <a:xfrm>
+            <a:off x="738188" y="3939320"/>
+            <a:ext cx="3776662" cy="2123658"/>
+          </a:xfrm>
+          <a:prstGeom prst="rect">
+            <a:avLst/>
+          </a:prstGeom>
+          <a:noFill/>
+        </p:spPr>
+        <p:txBody>
+          <a:bodyPr wrap="square">
+            <a:spAutoFit/>
+          </a:bodyPr>
+          <a:lstStyle/>
+          <a:p>
+            <a:r>
+              <a:rPr lang="en-US" b="1" dirty="0" err="1"/>
+              <a:t>ComponentX</a:t>
+            </a:r>
+            <a:endParaRPr lang="en-US" b="1" dirty="0"/>
+          </a:p>
+          <a:p>
+            <a:endParaRPr lang="en-US" dirty="0"/>
+          </a:p>
+          <a:p>
+            <a:endParaRPr lang="en-US" dirty="0"/>
+          </a:p>
+          <a:p>
+            <a:endParaRPr lang="en-US" dirty="0"/>
+          </a:p>
+          <a:p>
+            <a:endParaRPr lang="en-US" dirty="0"/>
+          </a:p>
+          <a:p>
+            <a:endParaRPr lang="en-US" sz="1400" dirty="0"/>
+          </a:p>
+          <a:p>
+            <a:r>
+              <a:rPr lang="en-US" sz="1400" dirty="0" err="1"/>
+              <a:t>Component_Type_From_Component</a:t>
+            </a:r>
+            <a:r>
+              <a:rPr lang="en-US" sz="1400" dirty="0"/>
+              <a:t>: Grid </a:t>
+            </a:r>
+          </a:p>
+          <a:p>
+            <a:r>
+              <a:rPr lang="en-US" sz="1400" dirty="0" err="1"/>
+              <a:t>Component_Order</a:t>
+            </a:r>
+            <a:r>
+              <a:rPr lang="en-US" sz="1400" dirty="0"/>
+              <a:t>: X</a:t>
+            </a:r>
+          </a:p>
+        </p:txBody>
+      </p:sp>
+      <p:sp>
+        <p:nvSpPr>
+          <p:cNvPr id="1076" name="Rechteck 1075">
+            <a:extLst>
+              <a:ext uri="{FF2B5EF4-FFF2-40B4-BE49-F238E27FC236}">
+                <a16:creationId xmlns:a16="http://schemas.microsoft.com/office/drawing/2014/main" id="{3F7FBD01-7DE7-EADC-C314-5D9CCECB7984}"/>
+              </a:ext>
+            </a:extLst>
+          </p:cNvPr>
+          <p:cNvSpPr/>
+          <p:nvPr/>
+        </p:nvSpPr>
+        <p:spPr>
+          <a:xfrm>
+            <a:off x="518612" y="3806190"/>
+            <a:ext cx="3870508" cy="2256788"/>
+          </a:xfrm>
+          <a:prstGeom prst="rect">
+            <a:avLst/>
+          </a:prstGeom>
+          <a:noFill/>
+          <a:ln>
+            <a:solidFill>
+              <a:schemeClr val="tx1"/>
+            </a:solidFill>
+          </a:ln>
+        </p:spPr>
+        <p:style>
+          <a:lnRef idx="2">
+            <a:schemeClr val="accent1">
+              <a:shade val="15000"/>
+            </a:schemeClr>
+          </a:lnRef>
+          <a:fillRef idx="1">
+            <a:schemeClr val="accent1"/>
+          </a:fillRef>
+          <a:effectRef idx="0">
+            <a:schemeClr val="accent1"/>
+          </a:effectRef>
+          <a:fontRef idx="minor">
+            <a:schemeClr val="lt1"/>
+          </a:fontRef>
+        </p:style>
+        <p:txBody>
+          <a:bodyPr rtlCol="0" anchor="ctr"/>
+          <a:lstStyle/>
+          <a:p>
+            <a:pPr algn="ctr"/>
+            <a:endParaRPr lang="en-US"/>
+          </a:p>
+        </p:txBody>
+      </p:sp>
+      <p:sp>
+        <p:nvSpPr>
+          <p:cNvPr id="1077" name="Rechteck 1076">
+            <a:extLst>
+              <a:ext uri="{FF2B5EF4-FFF2-40B4-BE49-F238E27FC236}">
+                <a16:creationId xmlns:a16="http://schemas.microsoft.com/office/drawing/2014/main" id="{80E8B75E-E65F-46C9-9AA0-0C47B0597C3D}"/>
+              </a:ext>
+            </a:extLst>
+          </p:cNvPr>
+          <p:cNvSpPr/>
+          <p:nvPr/>
+        </p:nvSpPr>
+        <p:spPr>
+          <a:xfrm>
+            <a:off x="751022" y="4316052"/>
+            <a:ext cx="1523548" cy="1080959"/>
+          </a:xfrm>
+          <a:prstGeom prst="rect">
+            <a:avLst/>
+          </a:prstGeom>
+          <a:noFill/>
+          <a:ln>
+            <a:solidFill>
+              <a:schemeClr val="tx1"/>
+            </a:solidFill>
+          </a:ln>
+        </p:spPr>
+        <p:style>
+          <a:lnRef idx="2">
+            <a:schemeClr val="accent1">
+              <a:shade val="15000"/>
+            </a:schemeClr>
+          </a:lnRef>
+          <a:fillRef idx="1">
+            <a:schemeClr val="accent1"/>
+          </a:fillRef>
+          <a:effectRef idx="0">
+            <a:schemeClr val="accent1"/>
+          </a:effectRef>
+          <a:fontRef idx="minor">
+            <a:schemeClr val="lt1"/>
+          </a:fontRef>
+        </p:style>
+        <p:txBody>
+          <a:bodyPr rtlCol="0" anchor="ctr"/>
+          <a:lstStyle/>
+          <a:p>
+            <a:pPr algn="ctr"/>
+            <a:endParaRPr lang="en-US"/>
+          </a:p>
+        </p:txBody>
+      </p:sp>
+      <p:sp>
+        <p:nvSpPr>
+          <p:cNvPr id="1078" name="Rechteck 1077">
+            <a:extLst>
+              <a:ext uri="{FF2B5EF4-FFF2-40B4-BE49-F238E27FC236}">
+                <a16:creationId xmlns:a16="http://schemas.microsoft.com/office/drawing/2014/main" id="{BFC0E96B-2373-048B-3E47-233FFE18E625}"/>
+              </a:ext>
+            </a:extLst>
+          </p:cNvPr>
+          <p:cNvSpPr/>
+          <p:nvPr/>
+        </p:nvSpPr>
+        <p:spPr>
+          <a:xfrm>
+            <a:off x="2570071" y="4316051"/>
+            <a:ext cx="1523548" cy="1080959"/>
+          </a:xfrm>
+          <a:prstGeom prst="rect">
+            <a:avLst/>
+          </a:prstGeom>
+          <a:noFill/>
+          <a:ln>
+            <a:solidFill>
+              <a:schemeClr val="tx1"/>
+            </a:solidFill>
+          </a:ln>
+        </p:spPr>
+        <p:style>
+          <a:lnRef idx="2">
+            <a:schemeClr val="accent1">
+              <a:shade val="15000"/>
+            </a:schemeClr>
+          </a:lnRef>
+          <a:fillRef idx="1">
+            <a:schemeClr val="accent1"/>
+          </a:fillRef>
+          <a:effectRef idx="0">
+            <a:schemeClr val="accent1"/>
+          </a:effectRef>
+          <a:fontRef idx="minor">
+            <a:schemeClr val="lt1"/>
+          </a:fontRef>
+        </p:style>
+        <p:txBody>
+          <a:bodyPr rtlCol="0" anchor="ctr"/>
+          <a:lstStyle/>
+          <a:p>
+            <a:pPr algn="ctr"/>
+            <a:endParaRPr lang="en-US"/>
+          </a:p>
+        </p:txBody>
+      </p:sp>
+      <p:sp>
+        <p:nvSpPr>
+          <p:cNvPr id="1079" name="Textfeld 1078">
+            <a:extLst>
+              <a:ext uri="{FF2B5EF4-FFF2-40B4-BE49-F238E27FC236}">
+                <a16:creationId xmlns:a16="http://schemas.microsoft.com/office/drawing/2014/main" id="{86C28FC5-8726-1C0E-452D-F6A69B8F9FC9}"/>
+              </a:ext>
+            </a:extLst>
+          </p:cNvPr>
+          <p:cNvSpPr txBox="1"/>
+          <p:nvPr/>
+        </p:nvSpPr>
+        <p:spPr>
+          <a:xfrm>
+            <a:off x="751022" y="4672757"/>
+            <a:ext cx="1513797" cy="800219"/>
+          </a:xfrm>
+          <a:prstGeom prst="rect">
+            <a:avLst/>
+          </a:prstGeom>
+          <a:noFill/>
+        </p:spPr>
+        <p:txBody>
+          <a:bodyPr wrap="square">
+            <a:spAutoFit/>
+          </a:bodyPr>
+          <a:lstStyle/>
+          <a:p>
+            <a:pPr algn="ctr"/>
+            <a:r>
+              <a:rPr lang="en-US" b="1" dirty="0"/>
+              <a:t>Widget1</a:t>
+            </a:r>
+          </a:p>
+          <a:p>
+            <a:endParaRPr lang="en-US" sz="1400" dirty="0"/>
+          </a:p>
+          <a:p>
+            <a:r>
+              <a:rPr lang="en-US" sz="1400" dirty="0"/>
+              <a:t>Priority:999</a:t>
+            </a:r>
+          </a:p>
+        </p:txBody>
+      </p:sp>
+      <p:sp>
+        <p:nvSpPr>
+          <p:cNvPr id="1080" name="Textfeld 1079">
+            <a:extLst>
+              <a:ext uri="{FF2B5EF4-FFF2-40B4-BE49-F238E27FC236}">
+                <a16:creationId xmlns:a16="http://schemas.microsoft.com/office/drawing/2014/main" id="{96A59853-E4A7-FCF6-FA4F-ABB41295F21F}"/>
+              </a:ext>
+            </a:extLst>
+          </p:cNvPr>
+          <p:cNvSpPr txBox="1"/>
+          <p:nvPr/>
+        </p:nvSpPr>
+        <p:spPr>
+          <a:xfrm>
+            <a:off x="2575560" y="4672757"/>
+            <a:ext cx="1513797" cy="800219"/>
+          </a:xfrm>
+          <a:prstGeom prst="rect">
+            <a:avLst/>
+          </a:prstGeom>
+          <a:noFill/>
+        </p:spPr>
+        <p:txBody>
+          <a:bodyPr wrap="square">
+            <a:spAutoFit/>
+          </a:bodyPr>
+          <a:lstStyle/>
+          <a:p>
+            <a:pPr algn="ctr"/>
+            <a:r>
+              <a:rPr lang="en-US" b="1" dirty="0" err="1"/>
+              <a:t>WidgetX</a:t>
+            </a:r>
+            <a:endParaRPr lang="en-US" b="1" dirty="0"/>
+          </a:p>
+          <a:p>
+            <a:endParaRPr lang="en-US" sz="1400" dirty="0"/>
+          </a:p>
+          <a:p>
+            <a:r>
+              <a:rPr lang="en-US" sz="1400" dirty="0"/>
+              <a:t>Priority:0</a:t>
+            </a:r>
+          </a:p>
+        </p:txBody>
+      </p:sp>
+      <p:sp>
+        <p:nvSpPr>
+          <p:cNvPr id="1081" name="Textfeld 1080">
+            <a:extLst>
+              <a:ext uri="{FF2B5EF4-FFF2-40B4-BE49-F238E27FC236}">
+                <a16:creationId xmlns:a16="http://schemas.microsoft.com/office/drawing/2014/main" id="{84C8BD7F-2FCE-9E37-8AB1-AD2F2F8DEB92}"/>
+              </a:ext>
+            </a:extLst>
+          </p:cNvPr>
+          <p:cNvSpPr txBox="1"/>
+          <p:nvPr/>
+        </p:nvSpPr>
+        <p:spPr>
+          <a:xfrm>
+            <a:off x="2241960" y="4671864"/>
+            <a:ext cx="343352" cy="369332"/>
+          </a:xfrm>
+          <a:prstGeom prst="rect">
+            <a:avLst/>
+          </a:prstGeom>
+          <a:noFill/>
+        </p:spPr>
+        <p:txBody>
+          <a:bodyPr wrap="square">
+            <a:spAutoFit/>
+          </a:bodyPr>
+          <a:lstStyle/>
+          <a:p>
+            <a:r>
+              <a:rPr lang="en-US" dirty="0"/>
+              <a:t>…</a:t>
+            </a:r>
+          </a:p>
+        </p:txBody>
+      </p:sp>
+      <p:sp>
+        <p:nvSpPr>
+          <p:cNvPr id="1082" name="Textfeld 1081">
+            <a:extLst>
+              <a:ext uri="{FF2B5EF4-FFF2-40B4-BE49-F238E27FC236}">
+                <a16:creationId xmlns:a16="http://schemas.microsoft.com/office/drawing/2014/main" id="{E86D6F16-4955-FB15-7751-2C7BFD9A7437}"/>
+              </a:ext>
+            </a:extLst>
+          </p:cNvPr>
+          <p:cNvSpPr txBox="1"/>
+          <p:nvPr/>
+        </p:nvSpPr>
+        <p:spPr>
+          <a:xfrm>
+            <a:off x="2241960" y="3171711"/>
+            <a:ext cx="343352" cy="369332"/>
+          </a:xfrm>
+          <a:prstGeom prst="rect">
+            <a:avLst/>
+          </a:prstGeom>
+          <a:noFill/>
+        </p:spPr>
+        <p:txBody>
+          <a:bodyPr wrap="square">
+            <a:spAutoFit/>
+          </a:bodyPr>
+          <a:lstStyle/>
+          <a:p>
+            <a:r>
+              <a:rPr lang="en-US" dirty="0"/>
+              <a:t>…</a:t>
+            </a:r>
+          </a:p>
+        </p:txBody>
+      </p:sp>
+      <p:sp>
+        <p:nvSpPr>
+          <p:cNvPr id="1083" name="Textfeld 1082">
+            <a:extLst>
+              <a:ext uri="{FF2B5EF4-FFF2-40B4-BE49-F238E27FC236}">
+                <a16:creationId xmlns:a16="http://schemas.microsoft.com/office/drawing/2014/main" id="{02988B5E-5D8D-4693-4100-81A738A2CCC7}"/>
+              </a:ext>
+            </a:extLst>
+          </p:cNvPr>
+          <p:cNvSpPr txBox="1"/>
+          <p:nvPr/>
+        </p:nvSpPr>
+        <p:spPr>
+          <a:xfrm>
+            <a:off x="386239" y="347716"/>
+            <a:ext cx="3776662" cy="369332"/>
+          </a:xfrm>
+          <a:prstGeom prst="rect">
+            <a:avLst/>
+          </a:prstGeom>
+          <a:noFill/>
+        </p:spPr>
+        <p:txBody>
+          <a:bodyPr wrap="square">
+            <a:spAutoFit/>
+          </a:bodyPr>
+          <a:lstStyle/>
+          <a:p>
+            <a:r>
+              <a:rPr lang="en-US" b="1" dirty="0"/>
+              <a:t>Layout</a:t>
+            </a:r>
+          </a:p>
+        </p:txBody>
+      </p:sp>
+      <p:sp>
+        <p:nvSpPr>
+          <p:cNvPr id="1084" name="Rechteck 1083">
+            <a:extLst>
+              <a:ext uri="{FF2B5EF4-FFF2-40B4-BE49-F238E27FC236}">
+                <a16:creationId xmlns:a16="http://schemas.microsoft.com/office/drawing/2014/main" id="{C3E6CFEB-0A2B-1D81-4863-D06FDB8AB70A}"/>
+              </a:ext>
+            </a:extLst>
+          </p:cNvPr>
+          <p:cNvSpPr/>
+          <p:nvPr/>
+        </p:nvSpPr>
+        <p:spPr>
+          <a:xfrm>
+            <a:off x="166662" y="214586"/>
+            <a:ext cx="4553927" cy="6295698"/>
+          </a:xfrm>
+          <a:prstGeom prst="rect">
+            <a:avLst/>
+          </a:prstGeom>
+          <a:noFill/>
+          <a:ln>
+            <a:solidFill>
+              <a:schemeClr val="tx1"/>
+            </a:solidFill>
+          </a:ln>
+        </p:spPr>
+        <p:style>
+          <a:lnRef idx="2">
+            <a:schemeClr val="accent1">
+              <a:shade val="15000"/>
+            </a:schemeClr>
+          </a:lnRef>
+          <a:fillRef idx="1">
+            <a:schemeClr val="accent1"/>
+          </a:fillRef>
+          <a:effectRef idx="0">
+            <a:schemeClr val="accent1"/>
+          </a:effectRef>
+          <a:fontRef idx="minor">
+            <a:schemeClr val="lt1"/>
+          </a:fontRef>
+        </p:style>
+        <p:txBody>
+          <a:bodyPr rtlCol="0" anchor="ctr"/>
+          <a:lstStyle/>
+          <a:p>
+            <a:pPr algn="ctr"/>
+            <a:endParaRPr lang="en-US"/>
+          </a:p>
+        </p:txBody>
+      </p:sp>
+      <p:pic>
+        <p:nvPicPr>
+          <p:cNvPr id="1086" name="Grafik 1085">
+            <a:extLst>
+              <a:ext uri="{FF2B5EF4-FFF2-40B4-BE49-F238E27FC236}">
+                <a16:creationId xmlns:a16="http://schemas.microsoft.com/office/drawing/2014/main" id="{15F3753C-00B0-49DC-6A98-D1D8A4D9819F}"/>
+              </a:ext>
+            </a:extLst>
+          </p:cNvPr>
+          <p:cNvPicPr>
+            <a:picLocks noChangeAspect="1"/>
+          </p:cNvPicPr>
+          <p:nvPr/>
+        </p:nvPicPr>
+        <p:blipFill>
+          <a:blip r:embed="rId2"/>
+          <a:stretch>
+            <a:fillRect/>
+          </a:stretch>
+        </p:blipFill>
+        <p:spPr>
+          <a:xfrm>
+            <a:off x="4825591" y="228677"/>
+            <a:ext cx="3407365" cy="2832699"/>
           </a:xfrm>
           <a:prstGeom prst="rect">
             <a:avLst/>
           </a:prstGeom>
         </p:spPr>
-        <p:style>
-          <a:lnRef idx="2">
-            <a:schemeClr val="dk1">
-              <a:shade val="15000"/>
-            </a:schemeClr>
-          </a:lnRef>
-          <a:fillRef idx="1">
-            <a:schemeClr val="dk1"/>
-          </a:fillRef>
-          <a:effectRef idx="0">
-            <a:schemeClr val="dk1"/>
-          </a:effectRef>
-          <a:fontRef idx="minor">
-            <a:schemeClr val="lt1"/>
-          </a:fontRef>
-        </p:style>
-        <p:txBody>
-          <a:bodyPr rtlCol="0" anchor="ctr"/>
-          <a:lstStyle/>
-          <a:p>
-            <a:pPr algn="ctr"/>
-            <a:endParaRPr lang="en-US"/>
-          </a:p>
-        </p:txBody>
-      </p:sp>
+      </p:pic>
+      <p:pic>
+        <p:nvPicPr>
+          <p:cNvPr id="1088" name="Grafik 1087">
+            <a:extLst>
+              <a:ext uri="{FF2B5EF4-FFF2-40B4-BE49-F238E27FC236}">
+                <a16:creationId xmlns:a16="http://schemas.microsoft.com/office/drawing/2014/main" id="{945EE15D-BCC4-DE78-38F1-B2766550F6FF}"/>
+              </a:ext>
+            </a:extLst>
+          </p:cNvPr>
+          <p:cNvPicPr>
+            <a:picLocks noChangeAspect="1"/>
+          </p:cNvPicPr>
+          <p:nvPr/>
+        </p:nvPicPr>
+        <p:blipFill>
+          <a:blip r:embed="rId3"/>
+          <a:stretch>
+            <a:fillRect/>
+          </a:stretch>
+        </p:blipFill>
+        <p:spPr>
+          <a:xfrm>
+            <a:off x="4756283" y="3147921"/>
+            <a:ext cx="3433449" cy="1789839"/>
+          </a:xfrm>
+          <a:prstGeom prst="rect">
+            <a:avLst/>
+          </a:prstGeom>
+        </p:spPr>
+      </p:pic>
     </p:spTree>
     <p:extLst>
       <p:ext uri="{BB962C8B-B14F-4D97-AF65-F5344CB8AC3E}">
-        <p14:creationId xmlns:p14="http://schemas.microsoft.com/office/powerpoint/2010/main" val="1556649687"/>
+        <p14:creationId xmlns:p14="http://schemas.microsoft.com/office/powerpoint/2010/main" val="3553721814"/>
       </p:ext>
     </p:extLst>
   </p:cSld>

</xml_diff>